<commit_message>
added link and chnged ppt
</commit_message>
<xml_diff>
--- a/FlexBox 1D.pptx
+++ b/FlexBox 1D.pptx
@@ -3057,7 +3057,11 @@
           <a:p>
             <a:r>
               <a:rPr lang="en-US" dirty="0" smtClean="0"/>
-              <a:t>		Joseph </a:t>
+              <a:t>		</a:t>
+            </a:r>
+            <a:r>
+              <a:rPr lang="en-US" dirty="0" smtClean="0"/>
+              <a:t>          Joseph </a:t>
             </a:r>
             <a:r>
               <a:rPr lang="en-US" dirty="0" err="1" smtClean="0"/>
@@ -3068,7 +3072,22 @@
           <a:p>
             <a:r>
               <a:rPr lang="en-US" dirty="0" smtClean="0"/>
-              <a:t>		  </a:t>
+              <a:t>		 </a:t>
+            </a:r>
+            <a:r>
+              <a:rPr lang="en-US" dirty="0" smtClean="0"/>
+              <a:t>	Hyndavi </a:t>
+            </a:r>
+            <a:r>
+              <a:rPr lang="en-US" dirty="0" err="1" smtClean="0"/>
+              <a:t>Musiaptla</a:t>
+            </a:r>
+            <a:endParaRPr lang="en-US" dirty="0" smtClean="0"/>
+          </a:p>
+          <a:p>
+            <a:r>
+              <a:rPr lang="en-US" dirty="0" smtClean="0"/>
+              <a:t>                                             </a:t>
             </a:r>
             <a:r>
               <a:rPr lang="en-US" dirty="0" err="1" smtClean="0"/>
@@ -3079,26 +3098,23 @@
               <a:t> </a:t>
             </a:r>
             <a:r>
-              <a:rPr lang="en-US" dirty="0" err="1" smtClean="0"/>
+              <a:rPr lang="en-US" dirty="0" err="1"/>
               <a:t>Kaitha</a:t>
             </a:r>
-            <a:endParaRPr lang="en-US" dirty="0" smtClean="0"/>
-          </a:p>
-          <a:p>
-            <a:r>
-              <a:rPr lang="en-US" dirty="0" smtClean="0"/>
-              <a:t>                                         Hyndavi </a:t>
-            </a:r>
-            <a:r>
-              <a:rPr lang="en-US" dirty="0" err="1"/>
-              <a:t>Musiaptla</a:t>
-            </a:r>
             <a:endParaRPr lang="en-US" dirty="0"/>
           </a:p>
           <a:p>
             <a:r>
               <a:rPr lang="en-US" dirty="0" smtClean="0"/>
               <a:t>		</a:t>
+            </a:r>
+            <a:r>
+              <a:rPr lang="en-US" dirty="0"/>
+              <a:t> </a:t>
+            </a:r>
+            <a:r>
+              <a:rPr lang="en-US" dirty="0" smtClean="0"/>
+              <a:t>           </a:t>
             </a:r>
             <a:r>
               <a:rPr lang="en-US" dirty="0" err="1" smtClean="0"/>
@@ -3109,15 +3125,23 @@
               <a:t> </a:t>
             </a:r>
             <a:r>
-              <a:rPr lang="en-US" dirty="0" err="1" smtClean="0"/>
+              <a:rPr lang="en-US" dirty="0" err="1"/>
               <a:t>Fakki</a:t>
             </a:r>
-            <a:endParaRPr lang="en-US" dirty="0" smtClean="0"/>
-          </a:p>
-          <a:p>
-            <a:r>
-              <a:rPr lang="en-US" dirty="0" smtClean="0"/>
-              <a:t>			</a:t>
+            <a:endParaRPr lang="en-US" dirty="0"/>
+          </a:p>
+          <a:p>
+            <a:r>
+              <a:rPr lang="en-US" dirty="0" smtClean="0"/>
+              <a:t>		</a:t>
+            </a:r>
+            <a:r>
+              <a:rPr lang="en-US" dirty="0"/>
+              <a:t> </a:t>
+            </a:r>
+            <a:r>
+              <a:rPr lang="en-US" dirty="0" smtClean="0"/>
+              <a:t>                              </a:t>
             </a:r>
             <a:r>
               <a:rPr lang="en-US" dirty="0" err="1" smtClean="0"/>
@@ -6624,8 +6648,8 @@
         </p:blipFill>
         <p:spPr>
           <a:xfrm>
-            <a:off x="548640" y="2476858"/>
-            <a:ext cx="10058400" cy="2500230"/>
+            <a:off x="1293223" y="2351603"/>
+            <a:ext cx="9248503" cy="2298913"/>
           </a:xfrm>
           <a:prstGeom prst="rect">
             <a:avLst/>

</xml_diff>